<commit_message>
Implemented argparse. Allowed to read config file.
</commit_message>
<xml_diff>
--- a/docs/ssga_sqlglot.pptx
+++ b/docs/ssga_sqlglot.pptx
@@ -6784,7 +6784,7 @@
         </p:blipFill>
         <p:spPr>
           <a:xfrm>
-            <a:off x="1103783" y="1015663"/>
+            <a:off x="1041999" y="916809"/>
             <a:ext cx="4126629" cy="5842337"/>
           </a:xfrm>
           <a:prstGeom prst="rect">
@@ -6963,7 +6963,31 @@
                 <a:latin typeface="Courier New" panose="02070309020205020404" pitchFamily="49" charset="0"/>
                 <a:cs typeface="Courier New" panose="02070309020205020404" pitchFamily="49" charset="0"/>
               </a:rPr>
-              <a:t>python translate.py Redshift_DDL_3_Tables.sql</a:t>
+              <a:t>python translate.py –</a:t>
+            </a:r>
+            <a:r>
+              <a:rPr lang="en-US" sz="2000" dirty="0" err="1">
+                <a:solidFill>
+                  <a:srgbClr val="00B050">
+                    <a:alpha val="70000"/>
+                  </a:srgbClr>
+                </a:solidFill>
+                <a:latin typeface="Courier New" panose="02070309020205020404" pitchFamily="49" charset="0"/>
+                <a:cs typeface="Courier New" panose="02070309020205020404" pitchFamily="49" charset="0"/>
+              </a:rPr>
+              <a:t>i</a:t>
+            </a:r>
+            <a:r>
+              <a:rPr lang="en-US" sz="2000" dirty="0">
+                <a:solidFill>
+                  <a:srgbClr val="00B050">
+                    <a:alpha val="70000"/>
+                  </a:srgbClr>
+                </a:solidFill>
+                <a:latin typeface="Courier New" panose="02070309020205020404" pitchFamily="49" charset="0"/>
+                <a:cs typeface="Courier New" panose="02070309020205020404" pitchFamily="49" charset="0"/>
+              </a:rPr>
+              <a:t> Redshift_DDL_3_Tables.sql</a:t>
             </a:r>
           </a:p>
           <a:p>

</xml_diff>